<commit_message>
Added videos. Presentation almost done.
</commit_message>
<xml_diff>
--- a/Documents/Presentation Slides.pptx
+++ b/Documents/Presentation Slides.pptx
@@ -6178,8 +6178,8 @@
         </p:nvSpPr>
         <p:spPr>
           <a:xfrm>
-            <a:off x="457200" y="1752600"/>
-            <a:ext cx="8229600" cy="4373563"/>
+            <a:off x="179512" y="1752600"/>
+            <a:ext cx="5256584" cy="4373563"/>
           </a:xfrm>
           <a:prstGeom prst="rect">
             <a:avLst/>
@@ -6352,12 +6352,132 @@
             </a:lvl9pPr>
           </a:lstStyle>
           <a:p>
-            <a:endParaRPr lang="en-CA" dirty="0">
+            <a:r>
+              <a:rPr lang="en-CA" sz="1800" dirty="0" smtClean="0">
+                <a:sym typeface="Wingdings" panose="05000000000000000000" pitchFamily="2" charset="2"/>
+              </a:rPr>
+              <a:t>Sitting SCV’s on enemy ramp messes up </a:t>
+            </a:r>
+            <a:r>
+              <a:rPr lang="en-CA" sz="1800" dirty="0" err="1" smtClean="0">
+                <a:sym typeface="Wingdings" panose="05000000000000000000" pitchFamily="2" charset="2"/>
+              </a:rPr>
+              <a:t>pathfinding</a:t>
+            </a:r>
+            <a:r>
+              <a:rPr lang="en-CA" sz="1800" dirty="0" smtClean="0">
+                <a:sym typeface="Wingdings" panose="05000000000000000000" pitchFamily="2" charset="2"/>
+              </a:rPr>
+              <a:t>, buildings and other units not effective.</a:t>
+            </a:r>
+            <a:endParaRPr lang="en-CA" sz="1800" dirty="0" smtClean="0">
               <a:sym typeface="Wingdings" panose="05000000000000000000" pitchFamily="2" charset="2"/>
             </a:endParaRPr>
           </a:p>
-        </p:txBody>
-      </p:sp>
+          <a:p>
+            <a:pPr marL="114300" indent="0">
+              <a:buNone/>
+            </a:pPr>
+            <a:endParaRPr lang="en-CA" sz="1800" dirty="0" smtClean="0">
+              <a:sym typeface="Wingdings" panose="05000000000000000000" pitchFamily="2" charset="2"/>
+            </a:endParaRPr>
+          </a:p>
+          <a:p>
+            <a:r>
+              <a:rPr lang="en-CA" sz="1800" dirty="0" smtClean="0">
+                <a:sym typeface="Wingdings" panose="05000000000000000000" pitchFamily="2" charset="2"/>
+              </a:rPr>
+              <a:t>Only seems to affect the </a:t>
+            </a:r>
+            <a:r>
+              <a:rPr lang="en-CA" sz="1800" dirty="0" err="1" smtClean="0">
+                <a:sym typeface="Wingdings" panose="05000000000000000000" pitchFamily="2" charset="2"/>
+              </a:rPr>
+              <a:t>Protoss</a:t>
+            </a:r>
+            <a:r>
+              <a:rPr lang="en-CA" sz="1800" dirty="0" smtClean="0">
+                <a:sym typeface="Wingdings" panose="05000000000000000000" pitchFamily="2" charset="2"/>
+              </a:rPr>
+              <a:t> based bots, since Marines and </a:t>
+            </a:r>
+            <a:r>
+              <a:rPr lang="en-CA" sz="1800" dirty="0" err="1" smtClean="0">
+                <a:sym typeface="Wingdings" panose="05000000000000000000" pitchFamily="2" charset="2"/>
+              </a:rPr>
+              <a:t>Zerglings</a:t>
+            </a:r>
+            <a:r>
+              <a:rPr lang="en-CA" sz="1800" dirty="0" smtClean="0">
+                <a:sym typeface="Wingdings" panose="05000000000000000000" pitchFamily="2" charset="2"/>
+              </a:rPr>
+              <a:t> auto attack their way through.</a:t>
+            </a:r>
+          </a:p>
+          <a:p>
+            <a:endParaRPr lang="en-CA" sz="1800" dirty="0">
+              <a:sym typeface="Wingdings" panose="05000000000000000000" pitchFamily="2" charset="2"/>
+            </a:endParaRPr>
+          </a:p>
+          <a:p>
+            <a:r>
+              <a:rPr lang="en-CA" sz="1800" dirty="0" smtClean="0">
+                <a:sym typeface="Wingdings" panose="05000000000000000000" pitchFamily="2" charset="2"/>
+              </a:rPr>
+              <a:t>Can completely contain opponent on 8/10 tournament maps.</a:t>
+            </a:r>
+          </a:p>
+          <a:p>
+            <a:pPr marL="114300" indent="0">
+              <a:buNone/>
+            </a:pPr>
+            <a:endParaRPr lang="en-CA" sz="1800" dirty="0">
+              <a:sym typeface="Wingdings" panose="05000000000000000000" pitchFamily="2" charset="2"/>
+            </a:endParaRPr>
+          </a:p>
+          <a:p>
+            <a:r>
+              <a:rPr lang="en-CA" sz="1800" dirty="0" smtClean="0">
+                <a:sym typeface="Wingdings" panose="05000000000000000000" pitchFamily="2" charset="2"/>
+              </a:rPr>
+              <a:t>Chokepoint finding has wide variety of potential uses.</a:t>
+            </a:r>
+            <a:endParaRPr lang="en-CA" sz="1800" dirty="0">
+              <a:sym typeface="Wingdings" panose="05000000000000000000" pitchFamily="2" charset="2"/>
+            </a:endParaRPr>
+          </a:p>
+        </p:txBody>
+      </p:sp>
+      <p:pic>
+        <p:nvPicPr>
+          <p:cNvPr id="4" name="Picture 3"/>
+          <p:cNvPicPr>
+            <a:picLocks noChangeAspect="1"/>
+          </p:cNvPicPr>
+          <p:nvPr/>
+        </p:nvPicPr>
+        <p:blipFill>
+          <a:blip r:embed="rId2">
+            <a:extLst>
+              <a:ext uri="{28A0092B-C50C-407E-A947-70E740481C1C}">
+                <a14:useLocalDpi xmlns:a14="http://schemas.microsoft.com/office/drawing/2010/main" val="0"/>
+              </a:ext>
+            </a:extLst>
+          </a:blip>
+          <a:stretch>
+            <a:fillRect/>
+          </a:stretch>
+        </p:blipFill>
+        <p:spPr>
+          <a:xfrm>
+            <a:off x="5436773" y="1755980"/>
+            <a:ext cx="3172268" cy="3761251"/>
+          </a:xfrm>
+          <a:prstGeom prst="rect">
+            <a:avLst/>
+          </a:prstGeom>
+        </p:spPr>
+      </p:pic>
     </p:spTree>
     <p:extLst>
       <p:ext uri="{BB962C8B-B14F-4D97-AF65-F5344CB8AC3E}">

</xml_diff>

<commit_message>
Presentation is finished and ready for tomorrow.
</commit_message>
<xml_diff>
--- a/Documents/Presentation Slides.pptx
+++ b/Documents/Presentation Slides.pptx
@@ -239,7 +239,7 @@
           <a:p>
             <a:fld id="{A2D71C1F-9832-4318-9CDD-88A3597ECA82}" type="datetimeFigureOut">
               <a:rPr lang="en-CA" smtClean="0"/>
-              <a:t>25/11/2014</a:t>
+              <a:t>30/11/2014</a:t>
             </a:fld>
             <a:endParaRPr lang="en-CA"/>
           </a:p>
@@ -872,7 +872,7 @@
           <a:p>
             <a:fld id="{A2D71C1F-9832-4318-9CDD-88A3597ECA82}" type="datetimeFigureOut">
               <a:rPr lang="en-CA" smtClean="0"/>
-              <a:t>25/11/2014</a:t>
+              <a:t>30/11/2014</a:t>
             </a:fld>
             <a:endParaRPr lang="en-CA"/>
           </a:p>
@@ -1149,7 +1149,7 @@
           <a:p>
             <a:fld id="{A2D71C1F-9832-4318-9CDD-88A3597ECA82}" type="datetimeFigureOut">
               <a:rPr lang="en-CA" smtClean="0"/>
-              <a:t>25/11/2014</a:t>
+              <a:t>30/11/2014</a:t>
             </a:fld>
             <a:endParaRPr lang="en-CA"/>
           </a:p>
@@ -1314,7 +1314,7 @@
           <a:p>
             <a:fld id="{A2D71C1F-9832-4318-9CDD-88A3597ECA82}" type="datetimeFigureOut">
               <a:rPr lang="en-CA" smtClean="0"/>
-              <a:t>25/11/2014</a:t>
+              <a:t>30/11/2014</a:t>
             </a:fld>
             <a:endParaRPr lang="en-CA"/>
           </a:p>
@@ -1495,7 +1495,7 @@
           <a:p>
             <a:fld id="{A2D71C1F-9832-4318-9CDD-88A3597ECA82}" type="datetimeFigureOut">
               <a:rPr lang="en-CA" smtClean="0"/>
-              <a:t>25/11/2014</a:t>
+              <a:t>30/11/2014</a:t>
             </a:fld>
             <a:endParaRPr lang="en-CA"/>
           </a:p>
@@ -2140,7 +2140,7 @@
           <a:p>
             <a:fld id="{A2D71C1F-9832-4318-9CDD-88A3597ECA82}" type="datetimeFigureOut">
               <a:rPr lang="en-CA" smtClean="0"/>
-              <a:t>25/11/2014</a:t>
+              <a:t>30/11/2014</a:t>
             </a:fld>
             <a:endParaRPr lang="en-CA"/>
           </a:p>
@@ -2566,7 +2566,7 @@
           <a:p>
             <a:fld id="{A2D71C1F-9832-4318-9CDD-88A3597ECA82}" type="datetimeFigureOut">
               <a:rPr lang="en-CA" smtClean="0"/>
-              <a:t>25/11/2014</a:t>
+              <a:t>30/11/2014</a:t>
             </a:fld>
             <a:endParaRPr lang="en-CA"/>
           </a:p>
@@ -2679,7 +2679,7 @@
           <a:p>
             <a:fld id="{A2D71C1F-9832-4318-9CDD-88A3597ECA82}" type="datetimeFigureOut">
               <a:rPr lang="en-CA" smtClean="0"/>
-              <a:t>25/11/2014</a:t>
+              <a:t>30/11/2014</a:t>
             </a:fld>
             <a:endParaRPr lang="en-CA"/>
           </a:p>
@@ -2860,7 +2860,7 @@
           <a:p>
             <a:fld id="{A2D71C1F-9832-4318-9CDD-88A3597ECA82}" type="datetimeFigureOut">
               <a:rPr lang="en-CA" smtClean="0"/>
-              <a:t>25/11/2014</a:t>
+              <a:t>30/11/2014</a:t>
             </a:fld>
             <a:endParaRPr lang="en-CA"/>
           </a:p>
@@ -3126,7 +3126,7 @@
           <a:p>
             <a:fld id="{A2D71C1F-9832-4318-9CDD-88A3597ECA82}" type="datetimeFigureOut">
               <a:rPr lang="en-CA" smtClean="0"/>
-              <a:t>25/11/2014</a:t>
+              <a:t>30/11/2014</a:t>
             </a:fld>
             <a:endParaRPr lang="en-CA"/>
           </a:p>
@@ -3596,7 +3596,7 @@
           <a:p>
             <a:fld id="{A2D71C1F-9832-4318-9CDD-88A3597ECA82}" type="datetimeFigureOut">
               <a:rPr lang="en-CA" smtClean="0"/>
-              <a:t>25/11/2014</a:t>
+              <a:t>30/11/2014</a:t>
             </a:fld>
             <a:endParaRPr lang="en-CA"/>
           </a:p>
@@ -4156,7 +4156,7 @@
           <a:p>
             <a:fld id="{A2D71C1F-9832-4318-9CDD-88A3597ECA82}" type="datetimeFigureOut">
               <a:rPr lang="en-CA" smtClean="0"/>
-              <a:t>25/11/2014</a:t>
+              <a:t>30/11/2014</a:t>
             </a:fld>
             <a:endParaRPr lang="en-CA"/>
           </a:p>
@@ -6058,17 +6058,56 @@
           <a:p>
             <a:r>
               <a:rPr lang="en-CA" sz="1800" dirty="0" smtClean="0">
-                <a:solidFill>
-                  <a:srgbClr val="FF0000"/>
-                </a:solidFill>
                 <a:sym typeface="Wingdings" panose="05000000000000000000" pitchFamily="2" charset="2"/>
               </a:rPr>
-              <a:t>BEN PLEASE FILL THE REST OF THIS IN, YOU KNOW IT BEST. I’LL MAKE A VID LATER.</a:t>
-            </a:r>
+              <a:t>Tries to stall with Bunkers, then spam out Vultures and Siege Tanks.</a:t>
+            </a:r>
+          </a:p>
+          <a:p>
             <a:endParaRPr lang="en-CA" sz="1800" dirty="0">
-              <a:solidFill>
-                <a:srgbClr val="FF0000"/>
-              </a:solidFill>
+              <a:sym typeface="Wingdings" panose="05000000000000000000" pitchFamily="2" charset="2"/>
+            </a:endParaRPr>
+          </a:p>
+          <a:p>
+            <a:r>
+              <a:rPr lang="en-CA" sz="1800" dirty="0" smtClean="0">
+                <a:sym typeface="Wingdings" panose="05000000000000000000" pitchFamily="2" charset="2"/>
+              </a:rPr>
+              <a:t>Avoids heavy use of Biological units, due to ineffectiveness against </a:t>
+            </a:r>
+            <a:r>
+              <a:rPr lang="en-CA" sz="1800" dirty="0" err="1" smtClean="0">
+                <a:sym typeface="Wingdings" panose="05000000000000000000" pitchFamily="2" charset="2"/>
+              </a:rPr>
+              <a:t>Protoss</a:t>
+            </a:r>
+            <a:r>
+              <a:rPr lang="en-CA" sz="1800" dirty="0" smtClean="0">
+                <a:sym typeface="Wingdings" panose="05000000000000000000" pitchFamily="2" charset="2"/>
+              </a:rPr>
+              <a:t>.</a:t>
+            </a:r>
+          </a:p>
+          <a:p>
+            <a:endParaRPr lang="en-CA" sz="1800" dirty="0">
+              <a:sym typeface="Wingdings" panose="05000000000000000000" pitchFamily="2" charset="2"/>
+            </a:endParaRPr>
+          </a:p>
+          <a:p>
+            <a:r>
+              <a:rPr lang="en-CA" sz="1800" dirty="0" smtClean="0">
+                <a:sym typeface="Wingdings" panose="05000000000000000000" pitchFamily="2" charset="2"/>
+              </a:rPr>
+              <a:t>Tactics hindered by occasional stalling of build order search.</a:t>
+            </a:r>
+          </a:p>
+          <a:p>
+            <a:endParaRPr lang="en-CA" sz="1800" dirty="0">
+              <a:sym typeface="Wingdings" panose="05000000000000000000" pitchFamily="2" charset="2"/>
+            </a:endParaRPr>
+          </a:p>
+          <a:p>
+            <a:endParaRPr lang="en-CA" sz="1800" dirty="0" smtClean="0">
               <a:sym typeface="Wingdings" panose="05000000000000000000" pitchFamily="2" charset="2"/>
             </a:endParaRPr>
           </a:p>
@@ -6162,7 +6201,7 @@
           <a:p>
             <a:r>
               <a:rPr lang="en-CA" dirty="0" smtClean="0"/>
-              <a:t>Ramp Camp: Our Magnum Opus</a:t>
+              <a:t>Not Choking on Chokepoints</a:t>
             </a:r>
             <a:endParaRPr lang="en-CA" dirty="0"/>
           </a:p>
@@ -6178,8 +6217,8 @@
         </p:nvSpPr>
         <p:spPr>
           <a:xfrm>
-            <a:off x="179512" y="1752600"/>
-            <a:ext cx="5256584" cy="4373563"/>
+            <a:off x="179512" y="1628800"/>
+            <a:ext cx="5256584" cy="4772744"/>
           </a:xfrm>
           <a:prstGeom prst="rect">
             <a:avLst/>
@@ -6356,23 +6395,8 @@
               <a:rPr lang="en-CA" sz="1800" dirty="0" smtClean="0">
                 <a:sym typeface="Wingdings" panose="05000000000000000000" pitchFamily="2" charset="2"/>
               </a:rPr>
-              <a:t>Sitting SCV’s on enemy ramp messes up </a:t>
-            </a:r>
-            <a:r>
-              <a:rPr lang="en-CA" sz="1800" dirty="0" err="1" smtClean="0">
-                <a:sym typeface="Wingdings" panose="05000000000000000000" pitchFamily="2" charset="2"/>
-              </a:rPr>
-              <a:t>pathfinding</a:t>
-            </a:r>
-            <a:r>
-              <a:rPr lang="en-CA" sz="1800" dirty="0" smtClean="0">
-                <a:sym typeface="Wingdings" panose="05000000000000000000" pitchFamily="2" charset="2"/>
-              </a:rPr>
-              <a:t>, buildings and other units not effective.</a:t>
-            </a:r>
-            <a:endParaRPr lang="en-CA" sz="1800" dirty="0" smtClean="0">
-              <a:sym typeface="Wingdings" panose="05000000000000000000" pitchFamily="2" charset="2"/>
-            </a:endParaRPr>
+              <a:t>BWTA chokepoint analysis proved effective, but frequently inaccurate</a:t>
+            </a:r>
           </a:p>
           <a:p>
             <a:pPr marL="114300" indent="0">
@@ -6387,44 +6411,20 @@
               <a:rPr lang="en-CA" sz="1800" dirty="0" smtClean="0">
                 <a:sym typeface="Wingdings" panose="05000000000000000000" pitchFamily="2" charset="2"/>
               </a:rPr>
-              <a:t>Only seems to affect the </a:t>
-            </a:r>
-            <a:r>
-              <a:rPr lang="en-CA" sz="1800" dirty="0" err="1" smtClean="0">
-                <a:sym typeface="Wingdings" panose="05000000000000000000" pitchFamily="2" charset="2"/>
-              </a:rPr>
-              <a:t>Protoss</a:t>
-            </a:r>
+              <a:t>Chokepoints very valuable strategically, intended to make use of them.</a:t>
+            </a:r>
+          </a:p>
+          <a:p>
+            <a:endParaRPr lang="en-CA" sz="1800" dirty="0">
+              <a:sym typeface="Wingdings" panose="05000000000000000000" pitchFamily="2" charset="2"/>
+            </a:endParaRPr>
+          </a:p>
+          <a:p>
             <a:r>
               <a:rPr lang="en-CA" sz="1800" dirty="0" smtClean="0">
                 <a:sym typeface="Wingdings" panose="05000000000000000000" pitchFamily="2" charset="2"/>
               </a:rPr>
-              <a:t> based bots, since Marines and </a:t>
-            </a:r>
-            <a:r>
-              <a:rPr lang="en-CA" sz="1800" dirty="0" err="1" smtClean="0">
-                <a:sym typeface="Wingdings" panose="05000000000000000000" pitchFamily="2" charset="2"/>
-              </a:rPr>
-              <a:t>Zerglings</a:t>
-            </a:r>
-            <a:r>
-              <a:rPr lang="en-CA" sz="1800" dirty="0" smtClean="0">
-                <a:sym typeface="Wingdings" panose="05000000000000000000" pitchFamily="2" charset="2"/>
-              </a:rPr>
-              <a:t> auto attack their way through.</a:t>
-            </a:r>
-          </a:p>
-          <a:p>
-            <a:endParaRPr lang="en-CA" sz="1800" dirty="0">
-              <a:sym typeface="Wingdings" panose="05000000000000000000" pitchFamily="2" charset="2"/>
-            </a:endParaRPr>
-          </a:p>
-          <a:p>
-            <a:r>
-              <a:rPr lang="en-CA" sz="1800" dirty="0" smtClean="0">
-                <a:sym typeface="Wingdings" panose="05000000000000000000" pitchFamily="2" charset="2"/>
-              </a:rPr>
-              <a:t>Can completely contain opponent on 8/10 tournament maps.</a:t>
+              <a:t>Managed to improve upon the algorithm in Map Tools, now detects chokepoints much more accurately.</a:t>
             </a:r>
           </a:p>
           <a:p>
@@ -6440,7 +6440,20 @@
               <a:rPr lang="en-CA" sz="1800" dirty="0" smtClean="0">
                 <a:sym typeface="Wingdings" panose="05000000000000000000" pitchFamily="2" charset="2"/>
               </a:rPr>
-              <a:t>Chokepoint finding has wide variety of potential uses.</a:t>
+              <a:t>Improvements also include, calculating the gap size and difficult the position is to guard based on that. </a:t>
+            </a:r>
+          </a:p>
+          <a:p>
+            <a:endParaRPr lang="en-CA" sz="1800" dirty="0">
+              <a:sym typeface="Wingdings" panose="05000000000000000000" pitchFamily="2" charset="2"/>
+            </a:endParaRPr>
+          </a:p>
+          <a:p>
+            <a:r>
+              <a:rPr lang="en-CA" sz="1800" dirty="0" smtClean="0">
+                <a:sym typeface="Wingdings" panose="05000000000000000000" pitchFamily="2" charset="2"/>
+              </a:rPr>
+              <a:t>Applications wide-ranging from a tactics view.</a:t>
             </a:r>
             <a:endParaRPr lang="en-CA" sz="1800" dirty="0">
               <a:sym typeface="Wingdings" panose="05000000000000000000" pitchFamily="2" charset="2"/>
@@ -6470,8 +6483,8 @@
         </p:blipFill>
         <p:spPr>
           <a:xfrm>
-            <a:off x="5436773" y="1755980"/>
-            <a:ext cx="3172268" cy="3761251"/>
+            <a:off x="5292080" y="1772816"/>
+            <a:ext cx="3531934" cy="2975036"/>
           </a:xfrm>
           <a:prstGeom prst="rect">
             <a:avLst/>

</xml_diff>